<commit_message>
Reordered / reworded some slides.
</commit_message>
<xml_diff>
--- a/r/NYPDShootingDataSlides.pptx
+++ b/r/NYPDShootingDataSlides.pptx
@@ -4,6 +4,9 @@
   <p:sldMasterIdLst>
     <p:sldMasterId id="2147483660" r:id="rId1"/>
   </p:sldMasterIdLst>
+  <p:notesMasterIdLst>
+    <p:notesMasterId r:id="rId24"/>
+  </p:notesMasterIdLst>
   <p:sldIdLst>
     <p:sldId id="256" r:id="rId2"/>
     <p:sldId id="257" r:id="rId3"/>
@@ -142,6 +145,1455 @@
     </p:ext>
   </p:extLst>
 </p:presentation>
+</file>
+
+<file path=ppt/notesMasters/notesMaster1.xml><?xml version="1.0" encoding="utf-8"?>
+<p:notesMaster xmlns:a="http://schemas.openxmlformats.org/drawingml/2006/main" xmlns:r="http://schemas.openxmlformats.org/officeDocument/2006/relationships" xmlns:p="http://schemas.openxmlformats.org/presentationml/2006/main">
+  <p:cSld>
+    <p:bg>
+      <p:bgRef idx="1001">
+        <a:schemeClr val="bg1"/>
+      </p:bgRef>
+    </p:bg>
+    <p:spTree>
+      <p:nvGrpSpPr>
+        <p:cNvPr id="1" name=""/>
+        <p:cNvGrpSpPr/>
+        <p:nvPr/>
+      </p:nvGrpSpPr>
+      <p:grpSpPr>
+        <a:xfrm>
+          <a:off x="0" y="0"/>
+          <a:ext cx="0" cy="0"/>
+          <a:chOff x="0" y="0"/>
+          <a:chExt cx="0" cy="0"/>
+        </a:xfrm>
+      </p:grpSpPr>
+      <p:sp>
+        <p:nvSpPr>
+          <p:cNvPr id="2" name="Header Placeholder 1"/>
+          <p:cNvSpPr>
+            <a:spLocks noGrp="1"/>
+          </p:cNvSpPr>
+          <p:nvPr>
+            <p:ph type="hdr" sz="quarter"/>
+          </p:nvPr>
+        </p:nvSpPr>
+        <p:spPr>
+          <a:xfrm>
+            <a:off x="0" y="0"/>
+            <a:ext cx="2971800" cy="458788"/>
+          </a:xfrm>
+          <a:prstGeom prst="rect">
+            <a:avLst/>
+          </a:prstGeom>
+        </p:spPr>
+        <p:txBody>
+          <a:bodyPr vert="horz" lIns="91440" tIns="45720" rIns="91440" bIns="45720" rtlCol="0"/>
+          <a:lstStyle>
+            <a:lvl1pPr algn="l">
+              <a:defRPr sz="1200"/>
+            </a:lvl1pPr>
+          </a:lstStyle>
+          <a:p>
+            <a:endParaRPr lang="en-US"/>
+          </a:p>
+        </p:txBody>
+      </p:sp>
+      <p:sp>
+        <p:nvSpPr>
+          <p:cNvPr id="3" name="Date Placeholder 2"/>
+          <p:cNvSpPr>
+            <a:spLocks noGrp="1"/>
+          </p:cNvSpPr>
+          <p:nvPr>
+            <p:ph type="dt" idx="1"/>
+          </p:nvPr>
+        </p:nvSpPr>
+        <p:spPr>
+          <a:xfrm>
+            <a:off x="3884613" y="0"/>
+            <a:ext cx="2971800" cy="458788"/>
+          </a:xfrm>
+          <a:prstGeom prst="rect">
+            <a:avLst/>
+          </a:prstGeom>
+        </p:spPr>
+        <p:txBody>
+          <a:bodyPr vert="horz" lIns="91440" tIns="45720" rIns="91440" bIns="45720" rtlCol="0"/>
+          <a:lstStyle>
+            <a:lvl1pPr algn="r">
+              <a:defRPr sz="1200"/>
+            </a:lvl1pPr>
+          </a:lstStyle>
+          <a:p>
+            <a:fld id="{0F9C1CCF-B725-44A7-AA57-5E433BD85C9F}" type="datetimeFigureOut">
+              <a:rPr lang="en-US" smtClean="0"/>
+              <a:t>3/20/2023</a:t>
+            </a:fld>
+            <a:endParaRPr lang="en-US"/>
+          </a:p>
+        </p:txBody>
+      </p:sp>
+      <p:sp>
+        <p:nvSpPr>
+          <p:cNvPr id="4" name="Slide Image Placeholder 3"/>
+          <p:cNvSpPr>
+            <a:spLocks noGrp="1" noRot="1" noChangeAspect="1"/>
+          </p:cNvSpPr>
+          <p:nvPr>
+            <p:ph type="sldImg" idx="2"/>
+          </p:nvPr>
+        </p:nvSpPr>
+        <p:spPr>
+          <a:xfrm>
+            <a:off x="1371600" y="1143000"/>
+            <a:ext cx="4114800" cy="3086100"/>
+          </a:xfrm>
+          <a:prstGeom prst="rect">
+            <a:avLst/>
+          </a:prstGeom>
+          <a:noFill/>
+          <a:ln w="12700">
+            <a:solidFill>
+              <a:prstClr val="black"/>
+            </a:solidFill>
+          </a:ln>
+        </p:spPr>
+        <p:txBody>
+          <a:bodyPr vert="horz" lIns="91440" tIns="45720" rIns="91440" bIns="45720" rtlCol="0" anchor="ctr"/>
+          <a:lstStyle/>
+          <a:p>
+            <a:endParaRPr lang="en-US"/>
+          </a:p>
+        </p:txBody>
+      </p:sp>
+      <p:sp>
+        <p:nvSpPr>
+          <p:cNvPr id="5" name="Notes Placeholder 4"/>
+          <p:cNvSpPr>
+            <a:spLocks noGrp="1"/>
+          </p:cNvSpPr>
+          <p:nvPr>
+            <p:ph type="body" sz="quarter" idx="3"/>
+          </p:nvPr>
+        </p:nvSpPr>
+        <p:spPr>
+          <a:xfrm>
+            <a:off x="685800" y="4400550"/>
+            <a:ext cx="5486400" cy="3600450"/>
+          </a:xfrm>
+          <a:prstGeom prst="rect">
+            <a:avLst/>
+          </a:prstGeom>
+        </p:spPr>
+        <p:txBody>
+          <a:bodyPr vert="horz" lIns="91440" tIns="45720" rIns="91440" bIns="45720" rtlCol="0"/>
+          <a:lstStyle/>
+          <a:p>
+            <a:pPr lvl="0"/>
+            <a:r>
+              <a:rPr lang="en-US"/>
+              <a:t>Click to edit Master text styles</a:t>
+            </a:r>
+          </a:p>
+          <a:p>
+            <a:pPr lvl="1"/>
+            <a:r>
+              <a:rPr lang="en-US"/>
+              <a:t>Second level</a:t>
+            </a:r>
+          </a:p>
+          <a:p>
+            <a:pPr lvl="2"/>
+            <a:r>
+              <a:rPr lang="en-US"/>
+              <a:t>Third level</a:t>
+            </a:r>
+          </a:p>
+          <a:p>
+            <a:pPr lvl="3"/>
+            <a:r>
+              <a:rPr lang="en-US"/>
+              <a:t>Fourth level</a:t>
+            </a:r>
+          </a:p>
+          <a:p>
+            <a:pPr lvl="4"/>
+            <a:r>
+              <a:rPr lang="en-US"/>
+              <a:t>Fifth level</a:t>
+            </a:r>
+          </a:p>
+        </p:txBody>
+      </p:sp>
+      <p:sp>
+        <p:nvSpPr>
+          <p:cNvPr id="6" name="Footer Placeholder 5"/>
+          <p:cNvSpPr>
+            <a:spLocks noGrp="1"/>
+          </p:cNvSpPr>
+          <p:nvPr>
+            <p:ph type="ftr" sz="quarter" idx="4"/>
+          </p:nvPr>
+        </p:nvSpPr>
+        <p:spPr>
+          <a:xfrm>
+            <a:off x="0" y="8685213"/>
+            <a:ext cx="2971800" cy="458787"/>
+          </a:xfrm>
+          <a:prstGeom prst="rect">
+            <a:avLst/>
+          </a:prstGeom>
+        </p:spPr>
+        <p:txBody>
+          <a:bodyPr vert="horz" lIns="91440" tIns="45720" rIns="91440" bIns="45720" rtlCol="0" anchor="b"/>
+          <a:lstStyle>
+            <a:lvl1pPr algn="l">
+              <a:defRPr sz="1200"/>
+            </a:lvl1pPr>
+          </a:lstStyle>
+          <a:p>
+            <a:endParaRPr lang="en-US"/>
+          </a:p>
+        </p:txBody>
+      </p:sp>
+      <p:sp>
+        <p:nvSpPr>
+          <p:cNvPr id="7" name="Slide Number Placeholder 6"/>
+          <p:cNvSpPr>
+            <a:spLocks noGrp="1"/>
+          </p:cNvSpPr>
+          <p:nvPr>
+            <p:ph type="sldNum" sz="quarter" idx="5"/>
+          </p:nvPr>
+        </p:nvSpPr>
+        <p:spPr>
+          <a:xfrm>
+            <a:off x="3884613" y="8685213"/>
+            <a:ext cx="2971800" cy="458787"/>
+          </a:xfrm>
+          <a:prstGeom prst="rect">
+            <a:avLst/>
+          </a:prstGeom>
+        </p:spPr>
+        <p:txBody>
+          <a:bodyPr vert="horz" lIns="91440" tIns="45720" rIns="91440" bIns="45720" rtlCol="0" anchor="b"/>
+          <a:lstStyle>
+            <a:lvl1pPr algn="r">
+              <a:defRPr sz="1200"/>
+            </a:lvl1pPr>
+          </a:lstStyle>
+          <a:p>
+            <a:fld id="{18BDFEC3-8487-43E8-A154-7C12CBC1FFF2}" type="slidenum">
+              <a:rPr lang="en-US" smtClean="0"/>
+              <a:t>‹#›</a:t>
+            </a:fld>
+            <a:endParaRPr lang="en-US"/>
+          </a:p>
+        </p:txBody>
+      </p:sp>
+    </p:spTree>
+    <p:extLst>
+      <p:ext uri="{BB962C8B-B14F-4D97-AF65-F5344CB8AC3E}">
+        <p14:creationId xmlns:p14="http://schemas.microsoft.com/office/powerpoint/2010/main" val="3782709779"/>
+      </p:ext>
+    </p:extLst>
+  </p:cSld>
+  <p:clrMap bg1="lt1" tx1="dk1" bg2="lt2" tx2="dk2" accent1="accent1" accent2="accent2" accent3="accent3" accent4="accent4" accent5="accent5" accent6="accent6" hlink="hlink" folHlink="folHlink"/>
+  <p:notesStyle>
+    <a:lvl1pPr marL="0" algn="l" defTabSz="914400" rtl="0" eaLnBrk="1" latinLnBrk="0" hangingPunct="1">
+      <a:defRPr sz="1200" kern="1200">
+        <a:solidFill>
+          <a:schemeClr val="tx1"/>
+        </a:solidFill>
+        <a:latin typeface="+mn-lt"/>
+        <a:ea typeface="+mn-ea"/>
+        <a:cs typeface="+mn-cs"/>
+      </a:defRPr>
+    </a:lvl1pPr>
+    <a:lvl2pPr marL="457200" algn="l" defTabSz="914400" rtl="0" eaLnBrk="1" latinLnBrk="0" hangingPunct="1">
+      <a:defRPr sz="1200" kern="1200">
+        <a:solidFill>
+          <a:schemeClr val="tx1"/>
+        </a:solidFill>
+        <a:latin typeface="+mn-lt"/>
+        <a:ea typeface="+mn-ea"/>
+        <a:cs typeface="+mn-cs"/>
+      </a:defRPr>
+    </a:lvl2pPr>
+    <a:lvl3pPr marL="914400" algn="l" defTabSz="914400" rtl="0" eaLnBrk="1" latinLnBrk="0" hangingPunct="1">
+      <a:defRPr sz="1200" kern="1200">
+        <a:solidFill>
+          <a:schemeClr val="tx1"/>
+        </a:solidFill>
+        <a:latin typeface="+mn-lt"/>
+        <a:ea typeface="+mn-ea"/>
+        <a:cs typeface="+mn-cs"/>
+      </a:defRPr>
+    </a:lvl3pPr>
+    <a:lvl4pPr marL="1371600" algn="l" defTabSz="914400" rtl="0" eaLnBrk="1" latinLnBrk="0" hangingPunct="1">
+      <a:defRPr sz="1200" kern="1200">
+        <a:solidFill>
+          <a:schemeClr val="tx1"/>
+        </a:solidFill>
+        <a:latin typeface="+mn-lt"/>
+        <a:ea typeface="+mn-ea"/>
+        <a:cs typeface="+mn-cs"/>
+      </a:defRPr>
+    </a:lvl4pPr>
+    <a:lvl5pPr marL="1828800" algn="l" defTabSz="914400" rtl="0" eaLnBrk="1" latinLnBrk="0" hangingPunct="1">
+      <a:defRPr sz="1200" kern="1200">
+        <a:solidFill>
+          <a:schemeClr val="tx1"/>
+        </a:solidFill>
+        <a:latin typeface="+mn-lt"/>
+        <a:ea typeface="+mn-ea"/>
+        <a:cs typeface="+mn-cs"/>
+      </a:defRPr>
+    </a:lvl5pPr>
+    <a:lvl6pPr marL="2286000" algn="l" defTabSz="914400" rtl="0" eaLnBrk="1" latinLnBrk="0" hangingPunct="1">
+      <a:defRPr sz="1200" kern="1200">
+        <a:solidFill>
+          <a:schemeClr val="tx1"/>
+        </a:solidFill>
+        <a:latin typeface="+mn-lt"/>
+        <a:ea typeface="+mn-ea"/>
+        <a:cs typeface="+mn-cs"/>
+      </a:defRPr>
+    </a:lvl6pPr>
+    <a:lvl7pPr marL="2743200" algn="l" defTabSz="914400" rtl="0" eaLnBrk="1" latinLnBrk="0" hangingPunct="1">
+      <a:defRPr sz="1200" kern="1200">
+        <a:solidFill>
+          <a:schemeClr val="tx1"/>
+        </a:solidFill>
+        <a:latin typeface="+mn-lt"/>
+        <a:ea typeface="+mn-ea"/>
+        <a:cs typeface="+mn-cs"/>
+      </a:defRPr>
+    </a:lvl7pPr>
+    <a:lvl8pPr marL="3200400" algn="l" defTabSz="914400" rtl="0" eaLnBrk="1" latinLnBrk="0" hangingPunct="1">
+      <a:defRPr sz="1200" kern="1200">
+        <a:solidFill>
+          <a:schemeClr val="tx1"/>
+        </a:solidFill>
+        <a:latin typeface="+mn-lt"/>
+        <a:ea typeface="+mn-ea"/>
+        <a:cs typeface="+mn-cs"/>
+      </a:defRPr>
+    </a:lvl8pPr>
+    <a:lvl9pPr marL="3657600" algn="l" defTabSz="914400" rtl="0" eaLnBrk="1" latinLnBrk="0" hangingPunct="1">
+      <a:defRPr sz="1200" kern="1200">
+        <a:solidFill>
+          <a:schemeClr val="tx1"/>
+        </a:solidFill>
+        <a:latin typeface="+mn-lt"/>
+        <a:ea typeface="+mn-ea"/>
+        <a:cs typeface="+mn-cs"/>
+      </a:defRPr>
+    </a:lvl9pPr>
+  </p:notesStyle>
+</p:notesMaster>
+</file>
+
+<file path=ppt/notesSlides/notesSlide1.xml><?xml version="1.0" encoding="utf-8"?>
+<p:notes xmlns:a="http://schemas.openxmlformats.org/drawingml/2006/main" xmlns:r="http://schemas.openxmlformats.org/officeDocument/2006/relationships" xmlns:p="http://schemas.openxmlformats.org/presentationml/2006/main">
+  <p:cSld>
+    <p:spTree>
+      <p:nvGrpSpPr>
+        <p:cNvPr id="1" name=""/>
+        <p:cNvGrpSpPr/>
+        <p:nvPr/>
+      </p:nvGrpSpPr>
+      <p:grpSpPr>
+        <a:xfrm>
+          <a:off x="0" y="0"/>
+          <a:ext cx="0" cy="0"/>
+          <a:chOff x="0" y="0"/>
+          <a:chExt cx="0" cy="0"/>
+        </a:xfrm>
+      </p:grpSpPr>
+      <p:sp>
+        <p:nvSpPr>
+          <p:cNvPr id="2" name="Slide Image Placeholder 1"/>
+          <p:cNvSpPr>
+            <a:spLocks noGrp="1" noRot="1" noChangeAspect="1"/>
+          </p:cNvSpPr>
+          <p:nvPr>
+            <p:ph type="sldImg"/>
+          </p:nvPr>
+        </p:nvSpPr>
+        <p:spPr/>
+      </p:sp>
+      <p:sp>
+        <p:nvSpPr>
+          <p:cNvPr id="3" name="Notes Placeholder 2"/>
+          <p:cNvSpPr>
+            <a:spLocks noGrp="1"/>
+          </p:cNvSpPr>
+          <p:nvPr>
+            <p:ph type="body" idx="1"/>
+          </p:nvPr>
+        </p:nvSpPr>
+        <p:spPr/>
+        <p:txBody>
+          <a:bodyPr/>
+          <a:lstStyle/>
+          <a:p>
+            <a:pPr lvl="0" indent="0" marL="0">
+              <a:buNone/>
+            </a:pPr>
+            <a:r>
+              <a:rPr/>
+              <a:t>What are we looking at? Why should you care?</a:t>
+            </a:r>
+          </a:p>
+          <a:p>
+            <a:pPr lvl="0" indent="0" marL="0">
+              <a:buNone/>
+            </a:pPr>
+          </a:p>
+          <a:p>
+            <a:pPr lvl="0"/>
+            <a:r>
+              <a:rPr/>
+              <a:t>Shootings end or radically change the lives of both the victim and the shooter.</a:t>
+            </a:r>
+          </a:p>
+          <a:p>
+            <a:pPr lvl="0" indent="0" marL="0">
+              <a:buNone/>
+            </a:pPr>
+          </a:p>
+          <a:p>
+            <a:pPr lvl="0"/>
+            <a:r>
+              <a:rPr/>
+              <a:t>Understanding the patterns to shootings is vital when trying to reduce them or mitigate their effects.</a:t>
+            </a:r>
+          </a:p>
+          <a:p>
+            <a:pPr lvl="0" indent="0" marL="0">
+              <a:buNone/>
+            </a:pPr>
+          </a:p>
+          <a:p>
+            <a:pPr lvl="0" indent="0" marL="0">
+              <a:buNone/>
+            </a:pPr>
+            <a:r>
+              <a:rPr/>
+              <a:t>So this is data about a subject that’s important to people at both a personal and a systemic level.</a:t>
+            </a:r>
+          </a:p>
+        </p:txBody>
+      </p:sp>
+      <p:sp>
+        <p:nvSpPr>
+          <p:cNvPr id="4" name="Slide Number Placeholder 3"/>
+          <p:cNvSpPr>
+            <a:spLocks noGrp="1"/>
+          </p:cNvSpPr>
+          <p:nvPr>
+            <p:ph type="sldNum" sz="quarter" idx="10"/>
+          </p:nvPr>
+        </p:nvSpPr>
+        <p:spPr/>
+        <p:txBody>
+          <a:bodyPr/>
+          <a:lstStyle/>
+          <a:p>
+            <a:fld id="{18BDFEC3-8487-43E8-A154-7C12CBC1FFF2}" type="slidenum">
+              <a:rPr lang="en-US"/>
+              <a:t>2</a:t>
+            </a:fld>
+            <a:endParaRPr lang="en-US"/>
+          </a:p>
+        </p:txBody>
+      </p:sp>
+    </p:spTree>
+  </p:cSld>
+</p:notes>
+</file>
+
+<file path=ppt/notesSlides/notesSlide10.xml><?xml version="1.0" encoding="utf-8"?>
+<p:notes xmlns:a="http://schemas.openxmlformats.org/drawingml/2006/main" xmlns:r="http://schemas.openxmlformats.org/officeDocument/2006/relationships" xmlns:p="http://schemas.openxmlformats.org/presentationml/2006/main">
+  <p:cSld>
+    <p:spTree>
+      <p:nvGrpSpPr>
+        <p:cNvPr id="1" name=""/>
+        <p:cNvGrpSpPr/>
+        <p:nvPr/>
+      </p:nvGrpSpPr>
+      <p:grpSpPr>
+        <a:xfrm>
+          <a:off x="0" y="0"/>
+          <a:ext cx="0" cy="0"/>
+          <a:chOff x="0" y="0"/>
+          <a:chExt cx="0" cy="0"/>
+        </a:xfrm>
+      </p:grpSpPr>
+      <p:sp>
+        <p:nvSpPr>
+          <p:cNvPr id="2" name="Slide Image Placeholder 1"/>
+          <p:cNvSpPr>
+            <a:spLocks noGrp="1" noRot="1" noChangeAspect="1"/>
+          </p:cNvSpPr>
+          <p:nvPr>
+            <p:ph type="sldImg"/>
+          </p:nvPr>
+        </p:nvSpPr>
+        <p:spPr/>
+      </p:sp>
+      <p:sp>
+        <p:nvSpPr>
+          <p:cNvPr id="3" name="Notes Placeholder 2"/>
+          <p:cNvSpPr>
+            <a:spLocks noGrp="1"/>
+          </p:cNvSpPr>
+          <p:nvPr>
+            <p:ph type="body" idx="1"/>
+          </p:nvPr>
+        </p:nvSpPr>
+        <p:spPr/>
+        <p:txBody>
+          <a:bodyPr/>
+          <a:lstStyle/>
+          <a:p>
+            <a:pPr lvl="0" indent="0" marL="0">
+              <a:buNone/>
+            </a:pPr>
+            <a:r>
+              <a:rPr/>
+              <a:t>We see a strong weekly cycle as well, again fit nicely by a scaled-and-shifted sine wave.</a:t>
+            </a:r>
+          </a:p>
+          <a:p>
+            <a:pPr lvl="0" indent="0" marL="0">
+              <a:buNone/>
+            </a:pPr>
+          </a:p>
+          <a:p>
+            <a:pPr lvl="0" indent="0" marL="0">
+              <a:buNone/>
+            </a:pPr>
+            <a:r>
+              <a:rPr/>
+              <a:t>Weeks are a purely human phenomena, so the temperature explanation isn’t relevant here. This pattern is sustained across many years, so there must be </a:t>
+            </a:r>
+            <a:r>
+              <a:rPr i="1"/>
+              <a:t>some</a:t>
+            </a:r>
+            <a:r>
+              <a:rPr/>
+              <a:t> underlying mechanism.</a:t>
+            </a:r>
+          </a:p>
+        </p:txBody>
+      </p:sp>
+      <p:sp>
+        <p:nvSpPr>
+          <p:cNvPr id="4" name="Slide Number Placeholder 3"/>
+          <p:cNvSpPr>
+            <a:spLocks noGrp="1"/>
+          </p:cNvSpPr>
+          <p:nvPr>
+            <p:ph type="sldNum" sz="quarter" idx="10"/>
+          </p:nvPr>
+        </p:nvSpPr>
+        <p:spPr/>
+        <p:txBody>
+          <a:bodyPr/>
+          <a:lstStyle/>
+          <a:p>
+            <a:fld id="{18BDFEC3-8487-43E8-A154-7C12CBC1FFF2}" type="slidenum">
+              <a:rPr lang="en-US"/>
+              <a:t>11</a:t>
+            </a:fld>
+            <a:endParaRPr lang="en-US"/>
+          </a:p>
+        </p:txBody>
+      </p:sp>
+    </p:spTree>
+  </p:cSld>
+</p:notes>
+</file>
+
+<file path=ppt/notesSlides/notesSlide11.xml><?xml version="1.0" encoding="utf-8"?>
+<p:notes xmlns:a="http://schemas.openxmlformats.org/drawingml/2006/main" xmlns:r="http://schemas.openxmlformats.org/officeDocument/2006/relationships" xmlns:p="http://schemas.openxmlformats.org/presentationml/2006/main">
+  <p:cSld>
+    <p:spTree>
+      <p:nvGrpSpPr>
+        <p:cNvPr id="1" name=""/>
+        <p:cNvGrpSpPr/>
+        <p:nvPr/>
+      </p:nvGrpSpPr>
+      <p:grpSpPr>
+        <a:xfrm>
+          <a:off x="0" y="0"/>
+          <a:ext cx="0" cy="0"/>
+          <a:chOff x="0" y="0"/>
+          <a:chExt cx="0" cy="0"/>
+        </a:xfrm>
+      </p:grpSpPr>
+      <p:sp>
+        <p:nvSpPr>
+          <p:cNvPr id="2" name="Slide Image Placeholder 1"/>
+          <p:cNvSpPr>
+            <a:spLocks noGrp="1" noRot="1" noChangeAspect="1"/>
+          </p:cNvSpPr>
+          <p:nvPr>
+            <p:ph type="sldImg"/>
+          </p:nvPr>
+        </p:nvSpPr>
+        <p:spPr/>
+      </p:sp>
+      <p:sp>
+        <p:nvSpPr>
+          <p:cNvPr id="3" name="Notes Placeholder 2"/>
+          <p:cNvSpPr>
+            <a:spLocks noGrp="1"/>
+          </p:cNvSpPr>
+          <p:nvPr>
+            <p:ph type="body" idx="1"/>
+          </p:nvPr>
+        </p:nvSpPr>
+        <p:spPr/>
+        <p:txBody>
+          <a:bodyPr/>
+          <a:lstStyle/>
+          <a:p>
+            <a:pPr lvl="0" indent="0" marL="0">
+              <a:buNone/>
+            </a:pPr>
+            <a:r>
+              <a:rPr/>
+              <a:t>The times of day when shootings occur are also highly structured. Not a sine wave, but a tightly repeating pattern across the years.</a:t>
+            </a:r>
+          </a:p>
+          <a:p>
+            <a:pPr lvl="0" indent="0" marL="0">
+              <a:buNone/>
+            </a:pPr>
+          </a:p>
+          <a:p>
+            <a:pPr lvl="0" indent="0" marL="0">
+              <a:buNone/>
+            </a:pPr>
+            <a:r>
+              <a:rPr/>
+              <a:t>One feature of this chart can likely be explained by the fact that bars close at 4am in New York.</a:t>
+            </a:r>
+          </a:p>
+        </p:txBody>
+      </p:sp>
+      <p:sp>
+        <p:nvSpPr>
+          <p:cNvPr id="4" name="Slide Number Placeholder 3"/>
+          <p:cNvSpPr>
+            <a:spLocks noGrp="1"/>
+          </p:cNvSpPr>
+          <p:nvPr>
+            <p:ph type="sldNum" sz="quarter" idx="10"/>
+          </p:nvPr>
+        </p:nvSpPr>
+        <p:spPr/>
+        <p:txBody>
+          <a:bodyPr/>
+          <a:lstStyle/>
+          <a:p>
+            <a:fld id="{18BDFEC3-8487-43E8-A154-7C12CBC1FFF2}" type="slidenum">
+              <a:rPr lang="en-US"/>
+              <a:t>12</a:t>
+            </a:fld>
+            <a:endParaRPr lang="en-US"/>
+          </a:p>
+        </p:txBody>
+      </p:sp>
+    </p:spTree>
+  </p:cSld>
+</p:notes>
+</file>
+
+<file path=ppt/notesSlides/notesSlide12.xml><?xml version="1.0" encoding="utf-8"?>
+<p:notes xmlns:a="http://schemas.openxmlformats.org/drawingml/2006/main" xmlns:r="http://schemas.openxmlformats.org/officeDocument/2006/relationships" xmlns:p="http://schemas.openxmlformats.org/presentationml/2006/main">
+  <p:cSld>
+    <p:spTree>
+      <p:nvGrpSpPr>
+        <p:cNvPr id="1" name=""/>
+        <p:cNvGrpSpPr/>
+        <p:nvPr/>
+      </p:nvGrpSpPr>
+      <p:grpSpPr>
+        <a:xfrm>
+          <a:off x="0" y="0"/>
+          <a:ext cx="0" cy="0"/>
+          <a:chOff x="0" y="0"/>
+          <a:chExt cx="0" cy="0"/>
+        </a:xfrm>
+      </p:grpSpPr>
+      <p:sp>
+        <p:nvSpPr>
+          <p:cNvPr id="2" name="Slide Image Placeholder 1"/>
+          <p:cNvSpPr>
+            <a:spLocks noGrp="1" noRot="1" noChangeAspect="1"/>
+          </p:cNvSpPr>
+          <p:nvPr>
+            <p:ph type="sldImg"/>
+          </p:nvPr>
+        </p:nvSpPr>
+        <p:spPr/>
+      </p:sp>
+      <p:sp>
+        <p:nvSpPr>
+          <p:cNvPr id="3" name="Notes Placeholder 2"/>
+          <p:cNvSpPr>
+            <a:spLocks noGrp="1"/>
+          </p:cNvSpPr>
+          <p:nvPr>
+            <p:ph type="body" idx="1"/>
+          </p:nvPr>
+        </p:nvSpPr>
+        <p:spPr/>
+        <p:txBody>
+          <a:bodyPr/>
+          <a:lstStyle/>
+          <a:p>
+            <a:pPr lvl="0" indent="0" marL="0">
+              <a:buNone/>
+            </a:pPr>
+            <a:r>
+              <a:rPr/>
+              <a:t>Turning to the demographics of the people involved, we start with the race of the victim.</a:t>
+            </a:r>
+          </a:p>
+        </p:txBody>
+      </p:sp>
+      <p:sp>
+        <p:nvSpPr>
+          <p:cNvPr id="4" name="Slide Number Placeholder 3"/>
+          <p:cNvSpPr>
+            <a:spLocks noGrp="1"/>
+          </p:cNvSpPr>
+          <p:nvPr>
+            <p:ph type="sldNum" sz="quarter" idx="10"/>
+          </p:nvPr>
+        </p:nvSpPr>
+        <p:spPr/>
+        <p:txBody>
+          <a:bodyPr/>
+          <a:lstStyle/>
+          <a:p>
+            <a:fld id="{18BDFEC3-8487-43E8-A154-7C12CBC1FFF2}" type="slidenum">
+              <a:rPr lang="en-US"/>
+              <a:t>14</a:t>
+            </a:fld>
+            <a:endParaRPr lang="en-US"/>
+          </a:p>
+        </p:txBody>
+      </p:sp>
+    </p:spTree>
+  </p:cSld>
+</p:notes>
+</file>
+
+<file path=ppt/notesSlides/notesSlide2.xml><?xml version="1.0" encoding="utf-8"?>
+<p:notes xmlns:a="http://schemas.openxmlformats.org/drawingml/2006/main" xmlns:r="http://schemas.openxmlformats.org/officeDocument/2006/relationships" xmlns:p="http://schemas.openxmlformats.org/presentationml/2006/main">
+  <p:cSld>
+    <p:spTree>
+      <p:nvGrpSpPr>
+        <p:cNvPr id="1" name=""/>
+        <p:cNvGrpSpPr/>
+        <p:nvPr/>
+      </p:nvGrpSpPr>
+      <p:grpSpPr>
+        <a:xfrm>
+          <a:off x="0" y="0"/>
+          <a:ext cx="0" cy="0"/>
+          <a:chOff x="0" y="0"/>
+          <a:chExt cx="0" cy="0"/>
+        </a:xfrm>
+      </p:grpSpPr>
+      <p:sp>
+        <p:nvSpPr>
+          <p:cNvPr id="2" name="Slide Image Placeholder 1"/>
+          <p:cNvSpPr>
+            <a:spLocks noGrp="1" noRot="1" noChangeAspect="1"/>
+          </p:cNvSpPr>
+          <p:nvPr>
+            <p:ph type="sldImg"/>
+          </p:nvPr>
+        </p:nvSpPr>
+        <p:spPr/>
+      </p:sp>
+      <p:sp>
+        <p:nvSpPr>
+          <p:cNvPr id="3" name="Notes Placeholder 2"/>
+          <p:cNvSpPr>
+            <a:spLocks noGrp="1"/>
+          </p:cNvSpPr>
+          <p:nvPr>
+            <p:ph type="body" idx="1"/>
+          </p:nvPr>
+        </p:nvSpPr>
+        <p:spPr/>
+        <p:txBody>
+          <a:bodyPr/>
+          <a:lstStyle/>
+          <a:p>
+            <a:pPr lvl="0" indent="0" marL="0">
+              <a:buNone/>
+            </a:pPr>
+            <a:r>
+              <a:rPr/>
+              <a:t>This is a dataset from the NYPD, with links here to the data and a PDF describing it.</a:t>
+            </a:r>
+          </a:p>
+          <a:p>
+            <a:pPr lvl="0" indent="0" marL="0">
+              <a:buNone/>
+            </a:pPr>
+          </a:p>
+          <a:p>
+            <a:pPr lvl="0" indent="0" marL="0">
+              <a:buNone/>
+            </a:pPr>
+            <a:r>
+              <a:rPr/>
+              <a:t>This is a list of every shooting incident that occurred in New York since 2006, where someone was shot and injured. (And, it should be pointed out, where that was reported to or discovered by police.)</a:t>
+            </a:r>
+          </a:p>
+        </p:txBody>
+      </p:sp>
+      <p:sp>
+        <p:nvSpPr>
+          <p:cNvPr id="4" name="Slide Number Placeholder 3"/>
+          <p:cNvSpPr>
+            <a:spLocks noGrp="1"/>
+          </p:cNvSpPr>
+          <p:nvPr>
+            <p:ph type="sldNum" sz="quarter" idx="10"/>
+          </p:nvPr>
+        </p:nvSpPr>
+        <p:spPr/>
+        <p:txBody>
+          <a:bodyPr/>
+          <a:lstStyle/>
+          <a:p>
+            <a:fld id="{18BDFEC3-8487-43E8-A154-7C12CBC1FFF2}" type="slidenum">
+              <a:rPr lang="en-US"/>
+              <a:t>3</a:t>
+            </a:fld>
+            <a:endParaRPr lang="en-US"/>
+          </a:p>
+        </p:txBody>
+      </p:sp>
+    </p:spTree>
+  </p:cSld>
+</p:notes>
+</file>
+
+<file path=ppt/notesSlides/notesSlide3.xml><?xml version="1.0" encoding="utf-8"?>
+<p:notes xmlns:a="http://schemas.openxmlformats.org/drawingml/2006/main" xmlns:r="http://schemas.openxmlformats.org/officeDocument/2006/relationships" xmlns:p="http://schemas.openxmlformats.org/presentationml/2006/main">
+  <p:cSld>
+    <p:spTree>
+      <p:nvGrpSpPr>
+        <p:cNvPr id="1" name=""/>
+        <p:cNvGrpSpPr/>
+        <p:nvPr/>
+      </p:nvGrpSpPr>
+      <p:grpSpPr>
+        <a:xfrm>
+          <a:off x="0" y="0"/>
+          <a:ext cx="0" cy="0"/>
+          <a:chOff x="0" y="0"/>
+          <a:chExt cx="0" cy="0"/>
+        </a:xfrm>
+      </p:grpSpPr>
+      <p:sp>
+        <p:nvSpPr>
+          <p:cNvPr id="2" name="Slide Image Placeholder 1"/>
+          <p:cNvSpPr>
+            <a:spLocks noGrp="1" noRot="1" noChangeAspect="1"/>
+          </p:cNvSpPr>
+          <p:nvPr>
+            <p:ph type="sldImg"/>
+          </p:nvPr>
+        </p:nvSpPr>
+        <p:spPr/>
+      </p:sp>
+      <p:sp>
+        <p:nvSpPr>
+          <p:cNvPr id="3" name="Notes Placeholder 2"/>
+          <p:cNvSpPr>
+            <a:spLocks noGrp="1"/>
+          </p:cNvSpPr>
+          <p:nvPr>
+            <p:ph type="body" idx="1"/>
+          </p:nvPr>
+        </p:nvSpPr>
+        <p:spPr/>
+        <p:txBody>
+          <a:bodyPr/>
+          <a:lstStyle/>
+          <a:p>
+            <a:pPr lvl="0" indent="0" marL="0">
+              <a:buNone/>
+            </a:pPr>
+            <a:r>
+              <a:rPr/>
+              <a:t>I used some additional data from public sources for temperature and population.</a:t>
+            </a:r>
+          </a:p>
+        </p:txBody>
+      </p:sp>
+      <p:sp>
+        <p:nvSpPr>
+          <p:cNvPr id="4" name="Slide Number Placeholder 3"/>
+          <p:cNvSpPr>
+            <a:spLocks noGrp="1"/>
+          </p:cNvSpPr>
+          <p:nvPr>
+            <p:ph type="sldNum" sz="quarter" idx="10"/>
+          </p:nvPr>
+        </p:nvSpPr>
+        <p:spPr/>
+        <p:txBody>
+          <a:bodyPr/>
+          <a:lstStyle/>
+          <a:p>
+            <a:fld id="{18BDFEC3-8487-43E8-A154-7C12CBC1FFF2}" type="slidenum">
+              <a:rPr lang="en-US"/>
+              <a:t>4</a:t>
+            </a:fld>
+            <a:endParaRPr lang="en-US"/>
+          </a:p>
+        </p:txBody>
+      </p:sp>
+    </p:spTree>
+  </p:cSld>
+</p:notes>
+</file>
+
+<file path=ppt/notesSlides/notesSlide4.xml><?xml version="1.0" encoding="utf-8"?>
+<p:notes xmlns:a="http://schemas.openxmlformats.org/drawingml/2006/main" xmlns:r="http://schemas.openxmlformats.org/officeDocument/2006/relationships" xmlns:p="http://schemas.openxmlformats.org/presentationml/2006/main">
+  <p:cSld>
+    <p:spTree>
+      <p:nvGrpSpPr>
+        <p:cNvPr id="1" name=""/>
+        <p:cNvGrpSpPr/>
+        <p:nvPr/>
+      </p:nvGrpSpPr>
+      <p:grpSpPr>
+        <a:xfrm>
+          <a:off x="0" y="0"/>
+          <a:ext cx="0" cy="0"/>
+          <a:chOff x="0" y="0"/>
+          <a:chExt cx="0" cy="0"/>
+        </a:xfrm>
+      </p:grpSpPr>
+      <p:sp>
+        <p:nvSpPr>
+          <p:cNvPr id="2" name="Slide Image Placeholder 1"/>
+          <p:cNvSpPr>
+            <a:spLocks noGrp="1" noRot="1" noChangeAspect="1"/>
+          </p:cNvSpPr>
+          <p:nvPr>
+            <p:ph type="sldImg"/>
+          </p:nvPr>
+        </p:nvSpPr>
+        <p:spPr/>
+      </p:sp>
+      <p:sp>
+        <p:nvSpPr>
+          <p:cNvPr id="3" name="Notes Placeholder 2"/>
+          <p:cNvSpPr>
+            <a:spLocks noGrp="1"/>
+          </p:cNvSpPr>
+          <p:nvPr>
+            <p:ph type="body" idx="1"/>
+          </p:nvPr>
+        </p:nvSpPr>
+        <p:spPr/>
+        <p:txBody>
+          <a:bodyPr/>
+          <a:lstStyle/>
+          <a:p>
+            <a:pPr lvl="0" indent="0" marL="0">
+              <a:buNone/>
+            </a:pPr>
+            <a:r>
+              <a:rPr/>
+              <a:t>Before presenting the data, I just want to remind everyone that this is from an organization reporting on its own area of responsibility, which is an inherent conflict of interest (or rather a family of related conflicts, at different levels and in different parts of the organization).</a:t>
+            </a:r>
+          </a:p>
+        </p:txBody>
+      </p:sp>
+      <p:sp>
+        <p:nvSpPr>
+          <p:cNvPr id="4" name="Slide Number Placeholder 3"/>
+          <p:cNvSpPr>
+            <a:spLocks noGrp="1"/>
+          </p:cNvSpPr>
+          <p:nvPr>
+            <p:ph type="sldNum" sz="quarter" idx="10"/>
+          </p:nvPr>
+        </p:nvSpPr>
+        <p:spPr/>
+        <p:txBody>
+          <a:bodyPr/>
+          <a:lstStyle/>
+          <a:p>
+            <a:fld id="{18BDFEC3-8487-43E8-A154-7C12CBC1FFF2}" type="slidenum">
+              <a:rPr lang="en-US"/>
+              <a:t>5</a:t>
+            </a:fld>
+            <a:endParaRPr lang="en-US"/>
+          </a:p>
+        </p:txBody>
+      </p:sp>
+    </p:spTree>
+  </p:cSld>
+</p:notes>
+</file>
+
+<file path=ppt/notesSlides/notesSlide5.xml><?xml version="1.0" encoding="utf-8"?>
+<p:notes xmlns:a="http://schemas.openxmlformats.org/drawingml/2006/main" xmlns:r="http://schemas.openxmlformats.org/officeDocument/2006/relationships" xmlns:p="http://schemas.openxmlformats.org/presentationml/2006/main">
+  <p:cSld>
+    <p:spTree>
+      <p:nvGrpSpPr>
+        <p:cNvPr id="1" name=""/>
+        <p:cNvGrpSpPr/>
+        <p:nvPr/>
+      </p:nvGrpSpPr>
+      <p:grpSpPr>
+        <a:xfrm>
+          <a:off x="0" y="0"/>
+          <a:ext cx="0" cy="0"/>
+          <a:chOff x="0" y="0"/>
+          <a:chExt cx="0" cy="0"/>
+        </a:xfrm>
+      </p:grpSpPr>
+      <p:sp>
+        <p:nvSpPr>
+          <p:cNvPr id="2" name="Slide Image Placeholder 1"/>
+          <p:cNvSpPr>
+            <a:spLocks noGrp="1" noRot="1" noChangeAspect="1"/>
+          </p:cNvSpPr>
+          <p:nvPr>
+            <p:ph type="sldImg"/>
+          </p:nvPr>
+        </p:nvSpPr>
+        <p:spPr/>
+      </p:sp>
+      <p:sp>
+        <p:nvSpPr>
+          <p:cNvPr id="3" name="Notes Placeholder 2"/>
+          <p:cNvSpPr>
+            <a:spLocks noGrp="1"/>
+          </p:cNvSpPr>
+          <p:nvPr>
+            <p:ph type="body" idx="1"/>
+          </p:nvPr>
+        </p:nvSpPr>
+        <p:spPr/>
+        <p:txBody>
+          <a:bodyPr/>
+          <a:lstStyle/>
+          <a:p>
+            <a:pPr lvl="0" indent="0" marL="0">
+              <a:buNone/>
+            </a:pPr>
+            <a:r>
+              <a:rPr/>
+              <a:t>These slides are available on Github, as well as the full analysis which gets further into many of these topics including data cleaning.</a:t>
+            </a:r>
+          </a:p>
+        </p:txBody>
+      </p:sp>
+      <p:sp>
+        <p:nvSpPr>
+          <p:cNvPr id="4" name="Slide Number Placeholder 3"/>
+          <p:cNvSpPr>
+            <a:spLocks noGrp="1"/>
+          </p:cNvSpPr>
+          <p:nvPr>
+            <p:ph type="sldNum" sz="quarter" idx="10"/>
+          </p:nvPr>
+        </p:nvSpPr>
+        <p:spPr/>
+        <p:txBody>
+          <a:bodyPr/>
+          <a:lstStyle/>
+          <a:p>
+            <a:fld id="{18BDFEC3-8487-43E8-A154-7C12CBC1FFF2}" type="slidenum">
+              <a:rPr lang="en-US"/>
+              <a:t>6</a:t>
+            </a:fld>
+            <a:endParaRPr lang="en-US"/>
+          </a:p>
+        </p:txBody>
+      </p:sp>
+    </p:spTree>
+  </p:cSld>
+</p:notes>
+</file>
+
+<file path=ppt/notesSlides/notesSlide6.xml><?xml version="1.0" encoding="utf-8"?>
+<p:notes xmlns:a="http://schemas.openxmlformats.org/drawingml/2006/main" xmlns:r="http://schemas.openxmlformats.org/officeDocument/2006/relationships" xmlns:p="http://schemas.openxmlformats.org/presentationml/2006/main">
+  <p:cSld>
+    <p:spTree>
+      <p:nvGrpSpPr>
+        <p:cNvPr id="1" name=""/>
+        <p:cNvGrpSpPr/>
+        <p:nvPr/>
+      </p:nvGrpSpPr>
+      <p:grpSpPr>
+        <a:xfrm>
+          <a:off x="0" y="0"/>
+          <a:ext cx="0" cy="0"/>
+          <a:chOff x="0" y="0"/>
+          <a:chExt cx="0" cy="0"/>
+        </a:xfrm>
+      </p:grpSpPr>
+      <p:sp>
+        <p:nvSpPr>
+          <p:cNvPr id="2" name="Slide Image Placeholder 1"/>
+          <p:cNvSpPr>
+            <a:spLocks noGrp="1" noRot="1" noChangeAspect="1"/>
+          </p:cNvSpPr>
+          <p:nvPr>
+            <p:ph type="sldImg"/>
+          </p:nvPr>
+        </p:nvSpPr>
+        <p:spPr/>
+      </p:sp>
+      <p:sp>
+        <p:nvSpPr>
+          <p:cNvPr id="3" name="Notes Placeholder 2"/>
+          <p:cNvSpPr>
+            <a:spLocks noGrp="1"/>
+          </p:cNvSpPr>
+          <p:nvPr>
+            <p:ph type="body" idx="1"/>
+          </p:nvPr>
+        </p:nvSpPr>
+        <p:spPr/>
+        <p:txBody>
+          <a:bodyPr/>
+          <a:lstStyle/>
+          <a:p>
+            <a:pPr lvl="0" indent="0" marL="0">
+              <a:buNone/>
+            </a:pPr>
+            <a:r>
+              <a:rPr/>
+              <a:t>In this analysis I consider the patterns of these incidents in terms of 1) time and 2) the demographics of the victims and perpetrators.</a:t>
+            </a:r>
+          </a:p>
+        </p:txBody>
+      </p:sp>
+      <p:sp>
+        <p:nvSpPr>
+          <p:cNvPr id="4" name="Slide Number Placeholder 3"/>
+          <p:cNvSpPr>
+            <a:spLocks noGrp="1"/>
+          </p:cNvSpPr>
+          <p:nvPr>
+            <p:ph type="sldNum" sz="quarter" idx="10"/>
+          </p:nvPr>
+        </p:nvSpPr>
+        <p:spPr/>
+        <p:txBody>
+          <a:bodyPr/>
+          <a:lstStyle/>
+          <a:p>
+            <a:fld id="{18BDFEC3-8487-43E8-A154-7C12CBC1FFF2}" type="slidenum">
+              <a:rPr lang="en-US"/>
+              <a:t>7</a:t>
+            </a:fld>
+            <a:endParaRPr lang="en-US"/>
+          </a:p>
+        </p:txBody>
+      </p:sp>
+    </p:spTree>
+  </p:cSld>
+</p:notes>
+</file>
+
+<file path=ppt/notesSlides/notesSlide7.xml><?xml version="1.0" encoding="utf-8"?>
+<p:notes xmlns:a="http://schemas.openxmlformats.org/drawingml/2006/main" xmlns:r="http://schemas.openxmlformats.org/officeDocument/2006/relationships" xmlns:p="http://schemas.openxmlformats.org/presentationml/2006/main">
+  <p:cSld>
+    <p:spTree>
+      <p:nvGrpSpPr>
+        <p:cNvPr id="1" name=""/>
+        <p:cNvGrpSpPr/>
+        <p:nvPr/>
+      </p:nvGrpSpPr>
+      <p:grpSpPr>
+        <a:xfrm>
+          <a:off x="0" y="0"/>
+          <a:ext cx="0" cy="0"/>
+          <a:chOff x="0" y="0"/>
+          <a:chExt cx="0" cy="0"/>
+        </a:xfrm>
+      </p:grpSpPr>
+      <p:sp>
+        <p:nvSpPr>
+          <p:cNvPr id="2" name="Slide Image Placeholder 1"/>
+          <p:cNvSpPr>
+            <a:spLocks noGrp="1" noRot="1" noChangeAspect="1"/>
+          </p:cNvSpPr>
+          <p:nvPr>
+            <p:ph type="sldImg"/>
+          </p:nvPr>
+        </p:nvSpPr>
+        <p:spPr/>
+      </p:sp>
+      <p:sp>
+        <p:nvSpPr>
+          <p:cNvPr id="3" name="Notes Placeholder 2"/>
+          <p:cNvSpPr>
+            <a:spLocks noGrp="1"/>
+          </p:cNvSpPr>
+          <p:nvPr>
+            <p:ph type="body" idx="1"/>
+          </p:nvPr>
+        </p:nvSpPr>
+        <p:spPr/>
+        <p:txBody>
+          <a:bodyPr/>
+          <a:lstStyle/>
+          <a:p>
+            <a:pPr lvl="0" indent="0" marL="0">
+              <a:buNone/>
+            </a:pPr>
+            <a:r>
+              <a:rPr/>
+              <a:t>We look first at the time axis, on several different scales.</a:t>
+            </a:r>
+          </a:p>
+        </p:txBody>
+      </p:sp>
+      <p:sp>
+        <p:nvSpPr>
+          <p:cNvPr id="4" name="Slide Number Placeholder 3"/>
+          <p:cNvSpPr>
+            <a:spLocks noGrp="1"/>
+          </p:cNvSpPr>
+          <p:nvPr>
+            <p:ph type="sldNum" sz="quarter" idx="10"/>
+          </p:nvPr>
+        </p:nvSpPr>
+        <p:spPr/>
+        <p:txBody>
+          <a:bodyPr/>
+          <a:lstStyle/>
+          <a:p>
+            <a:fld id="{18BDFEC3-8487-43E8-A154-7C12CBC1FFF2}" type="slidenum">
+              <a:rPr lang="en-US"/>
+              <a:t>8</a:t>
+            </a:fld>
+            <a:endParaRPr lang="en-US"/>
+          </a:p>
+        </p:txBody>
+      </p:sp>
+    </p:spTree>
+  </p:cSld>
+</p:notes>
+</file>
+
+<file path=ppt/notesSlides/notesSlide8.xml><?xml version="1.0" encoding="utf-8"?>
+<p:notes xmlns:a="http://schemas.openxmlformats.org/drawingml/2006/main" xmlns:r="http://schemas.openxmlformats.org/officeDocument/2006/relationships" xmlns:p="http://schemas.openxmlformats.org/presentationml/2006/main">
+  <p:cSld>
+    <p:spTree>
+      <p:nvGrpSpPr>
+        <p:cNvPr id="1" name=""/>
+        <p:cNvGrpSpPr/>
+        <p:nvPr/>
+      </p:nvGrpSpPr>
+      <p:grpSpPr>
+        <a:xfrm>
+          <a:off x="0" y="0"/>
+          <a:ext cx="0" cy="0"/>
+          <a:chOff x="0" y="0"/>
+          <a:chExt cx="0" cy="0"/>
+        </a:xfrm>
+      </p:grpSpPr>
+      <p:sp>
+        <p:nvSpPr>
+          <p:cNvPr id="2" name="Slide Image Placeholder 1"/>
+          <p:cNvSpPr>
+            <a:spLocks noGrp="1" noRot="1" noChangeAspect="1"/>
+          </p:cNvSpPr>
+          <p:nvPr>
+            <p:ph type="sldImg"/>
+          </p:nvPr>
+        </p:nvSpPr>
+        <p:spPr/>
+      </p:sp>
+      <p:sp>
+        <p:nvSpPr>
+          <p:cNvPr id="3" name="Notes Placeholder 2"/>
+          <p:cNvSpPr>
+            <a:spLocks noGrp="1"/>
+          </p:cNvSpPr>
+          <p:nvPr>
+            <p:ph type="body" idx="1"/>
+          </p:nvPr>
+        </p:nvSpPr>
+        <p:spPr/>
+        <p:txBody>
+          <a:bodyPr/>
+          <a:lstStyle/>
+          <a:p>
+            <a:pPr lvl="0" indent="0" marL="0">
+              <a:buNone/>
+            </a:pPr>
+            <a:r>
+              <a:rPr/>
+              <a:t>As you see in the chart, an initial roughly-linear trend through 2019 turned into a steep rise in 2020, sustained in 2021. This two-stage macro behavior dominates everything else. Therefore, for the rest of this presentation, all graphs will be normalized to “fraction of the incidents that year” to reveal patterns otherwise masked.</a:t>
+            </a:r>
+          </a:p>
+        </p:txBody>
+      </p:sp>
+      <p:sp>
+        <p:nvSpPr>
+          <p:cNvPr id="4" name="Slide Number Placeholder 3"/>
+          <p:cNvSpPr>
+            <a:spLocks noGrp="1"/>
+          </p:cNvSpPr>
+          <p:nvPr>
+            <p:ph type="sldNum" sz="quarter" idx="10"/>
+          </p:nvPr>
+        </p:nvSpPr>
+        <p:spPr/>
+        <p:txBody>
+          <a:bodyPr/>
+          <a:lstStyle/>
+          <a:p>
+            <a:fld id="{18BDFEC3-8487-43E8-A154-7C12CBC1FFF2}" type="slidenum">
+              <a:rPr lang="en-US"/>
+              <a:t>9</a:t>
+            </a:fld>
+            <a:endParaRPr lang="en-US"/>
+          </a:p>
+        </p:txBody>
+      </p:sp>
+    </p:spTree>
+  </p:cSld>
+</p:notes>
+</file>
+
+<file path=ppt/notesSlides/notesSlide9.xml><?xml version="1.0" encoding="utf-8"?>
+<p:notes xmlns:a="http://schemas.openxmlformats.org/drawingml/2006/main" xmlns:r="http://schemas.openxmlformats.org/officeDocument/2006/relationships" xmlns:p="http://schemas.openxmlformats.org/presentationml/2006/main">
+  <p:cSld>
+    <p:spTree>
+      <p:nvGrpSpPr>
+        <p:cNvPr id="1" name=""/>
+        <p:cNvGrpSpPr/>
+        <p:nvPr/>
+      </p:nvGrpSpPr>
+      <p:grpSpPr>
+        <a:xfrm>
+          <a:off x="0" y="0"/>
+          <a:ext cx="0" cy="0"/>
+          <a:chOff x="0" y="0"/>
+          <a:chExt cx="0" cy="0"/>
+        </a:xfrm>
+      </p:grpSpPr>
+      <p:sp>
+        <p:nvSpPr>
+          <p:cNvPr id="2" name="Slide Image Placeholder 1"/>
+          <p:cNvSpPr>
+            <a:spLocks noGrp="1" noRot="1" noChangeAspect="1"/>
+          </p:cNvSpPr>
+          <p:nvPr>
+            <p:ph type="sldImg"/>
+          </p:nvPr>
+        </p:nvSpPr>
+        <p:spPr/>
+      </p:sp>
+      <p:sp>
+        <p:nvSpPr>
+          <p:cNvPr id="3" name="Notes Placeholder 2"/>
+          <p:cNvSpPr>
+            <a:spLocks noGrp="1"/>
+          </p:cNvSpPr>
+          <p:nvPr>
+            <p:ph type="body" idx="1"/>
+          </p:nvPr>
+        </p:nvSpPr>
+        <p:spPr/>
+        <p:txBody>
+          <a:bodyPr/>
+          <a:lstStyle/>
+          <a:p>
+            <a:pPr lvl="0" indent="0" marL="0">
+              <a:buNone/>
+            </a:pPr>
+            <a:r>
+              <a:rPr/>
+              <a:t>Turning to variation within a year, we see a strong monthly pattern. This can be approximated quite well by a scaled-and-shifted sine wave, and more suggestively, by average temperature data for the city.</a:t>
+            </a:r>
+          </a:p>
+          <a:p>
+            <a:pPr lvl="0" indent="0" marL="0">
+              <a:buNone/>
+            </a:pPr>
+          </a:p>
+          <a:p>
+            <a:pPr lvl="0" indent="0" marL="0">
+              <a:buNone/>
+            </a:pPr>
+            <a:r>
+              <a:rPr/>
+              <a:t>This suggests, though in no way proves, a connection between temperature, behavior, and propensity for shootings.</a:t>
+            </a:r>
+          </a:p>
+          <a:p>
+            <a:pPr lvl="0" indent="0" marL="0">
+              <a:buNone/>
+            </a:pPr>
+          </a:p>
+          <a:p>
+            <a:pPr lvl="0" indent="0" marL="0">
+              <a:buNone/>
+            </a:pPr>
+            <a:r>
+              <a:rPr/>
+              <a:t>Note that the fit is in no way perfect; that overshoot in February and undershoot in December are notable.</a:t>
+            </a:r>
+          </a:p>
+        </p:txBody>
+      </p:sp>
+      <p:sp>
+        <p:nvSpPr>
+          <p:cNvPr id="4" name="Slide Number Placeholder 3"/>
+          <p:cNvSpPr>
+            <a:spLocks noGrp="1"/>
+          </p:cNvSpPr>
+          <p:nvPr>
+            <p:ph type="sldNum" sz="quarter" idx="10"/>
+          </p:nvPr>
+        </p:nvSpPr>
+        <p:spPr/>
+        <p:txBody>
+          <a:bodyPr/>
+          <a:lstStyle/>
+          <a:p>
+            <a:fld id="{18BDFEC3-8487-43E8-A154-7C12CBC1FFF2}" type="slidenum">
+              <a:rPr lang="en-US"/>
+              <a:t>10</a:t>
+            </a:fld>
+            <a:endParaRPr lang="en-US"/>
+          </a:p>
+        </p:txBody>
+      </p:sp>
+    </p:spTree>
+  </p:cSld>
+</p:notes>
 </file>
 
 <file path=ppt/slideLayouts/slideLayout1.xml><?xml version="1.0" encoding="utf-8"?>
@@ -4028,7 +5480,7 @@
           <p:nvPr/>
         </p:nvPicPr>
         <p:blipFill>
-          <a:blip r:embed="rId2"/>
+          <a:blip r:embed="rId3"/>
           <a:stretch>
             <a:fillRect/>
           </a:stretch>
@@ -4144,7 +5596,7 @@
           <p:nvPr/>
         </p:nvPicPr>
         <p:blipFill>
-          <a:blip r:embed="rId2"/>
+          <a:blip r:embed="rId3"/>
           <a:stretch>
             <a:fillRect/>
           </a:stretch>
@@ -4260,7 +5712,7 @@
           <p:nvPr/>
         </p:nvPicPr>
         <p:blipFill>
-          <a:blip r:embed="rId2"/>
+          <a:blip r:embed="rId3"/>
           <a:stretch>
             <a:fillRect/>
           </a:stretch>
@@ -4305,7 +5757,7 @@
       </p:grpSpPr>
       <p:sp>
         <p:nvSpPr>
-          <p:cNvPr id="8" name="Title 7"/>
+          <p:cNvPr id="2" name="Title 1"/>
           <p:cNvSpPr>
             <a:spLocks noGrp="1"/>
           </p:cNvSpPr>
@@ -4313,22 +5765,17 @@
             <p:ph type="title"/>
           </p:nvPr>
         </p:nvSpPr>
-        <p:spPr>
-          <a:xfrm>
-            <a:off x="822960" y="286604"/>
-            <a:ext cx="7543800" cy="1450757"/>
-          </a:xfrm>
-        </p:spPr>
-        <p:txBody>
-          <a:bodyPr/>
-          <a:lstStyle/>
-          <a:p>
-            <a:pPr lvl="0" indent="0" marL="0">
-              <a:buNone/>
-            </a:pPr>
-            <a:r>
-              <a:rPr/>
-              <a:t>Demographics: Victim, By Race</a:t>
+        <p:spPr/>
+        <p:txBody>
+          <a:bodyPr/>
+          <a:lstStyle/>
+          <a:p>
+            <a:pPr lvl="0" indent="0" marL="0">
+              <a:buNone/>
+            </a:pPr>
+            <a:r>
+              <a:rPr/>
+              <a:t>Conclusions - Temporal Conclusions</a:t>
             </a:r>
           </a:p>
         </p:txBody>
@@ -4340,54 +5787,24 @@
             <a:spLocks noGrp="1"/>
           </p:cNvSpPr>
           <p:nvPr>
-            <p:ph idx="1" sz="half"/>
-          </p:nvPr>
-        </p:nvSpPr>
-        <p:spPr/>
-        <p:txBody>
-          <a:bodyPr/>
-          <a:lstStyle/>
-          <a:p>
-            <a:pPr lvl="0" indent="0" marL="0">
-              <a:buNone/>
-            </a:pPr>
-            <a:r>
-              <a:rPr/>
-              <a:t>The victim’s race is overwhelmingly coded as Black.</a:t>
-            </a:r>
-          </a:p>
-        </p:txBody>
-      </p:sp>
-      <p:pic>
-        <p:nvPicPr>
-          <p:cNvPr descr="NYPDShootingDataSlides_files/figure-pptx/vic_race-1.png" id="0" name="Picture 1"/>
-          <p:cNvPicPr>
-            <a:picLocks noGrp="1" noChangeAspect="1"/>
-          </p:cNvPicPr>
-          <p:nvPr/>
-        </p:nvPicPr>
-        <p:blipFill>
-          <a:blip r:embed="rId2"/>
-          <a:stretch>
-            <a:fillRect/>
-          </a:stretch>
-        </p:blipFill>
-        <p:spPr bwMode="auto">
-          <a:xfrm>
-            <a:off x="4660900" y="2374900"/>
-            <a:ext cx="3695700" cy="2959100"/>
-          </a:xfrm>
-          <a:prstGeom prst="rect">
-            <a:avLst/>
-          </a:prstGeom>
-          <a:noFill/>
-          <a:ln w="9525">
-            <a:noFill/>
-            <a:headEnd/>
-            <a:tailEnd/>
-          </a:ln>
-        </p:spPr>
-      </p:pic>
+            <p:ph idx="1"/>
+          </p:nvPr>
+        </p:nvSpPr>
+        <p:spPr/>
+        <p:txBody>
+          <a:bodyPr/>
+          <a:lstStyle/>
+          <a:p>
+            <a:pPr lvl="0" indent="0" marL="0">
+              <a:buNone/>
+            </a:pPr>
+            <a:r>
+              <a:rPr/>
+              <a:t>Despite sharp changes in overall incident counts, there are strong seasonal patterns at multiple scales: over the course of a day, a week, and a year</a:t>
+            </a:r>
+          </a:p>
+        </p:txBody>
+      </p:sp>
     </p:spTree>
   </p:cSld>
 </p:sld>
@@ -4435,7 +5852,7 @@
             </a:pPr>
             <a:r>
               <a:rPr/>
-              <a:t>Demographics: Perpetrator, by Race</a:t>
+              <a:t>Demographics: Victim, By Race</a:t>
             </a:r>
           </a:p>
         </p:txBody>
@@ -4460,21 +5877,21 @@
             </a:pPr>
             <a:r>
               <a:rPr/>
-              <a:t>The same holds true, in almost the same proportions, for the perpetrator’s race (where known).</a:t>
+              <a:t>The victim’s race is overwhelmingly coded as Black, disproportionate to the Black share of the overall city population.</a:t>
             </a:r>
           </a:p>
         </p:txBody>
       </p:sp>
       <p:pic>
         <p:nvPicPr>
-          <p:cNvPr descr="NYPDShootingDataSlides_files/figure-pptx/perp_race-1.png" id="0" name="Picture 1"/>
+          <p:cNvPr descr="NYPDShootingDataSlides_files/figure-pptx/vic_race-1.png" id="0" name="Picture 1"/>
           <p:cNvPicPr>
             <a:picLocks noGrp="1" noChangeAspect="1"/>
           </p:cNvPicPr>
           <p:nvPr/>
         </p:nvPicPr>
         <p:blipFill>
-          <a:blip r:embed="rId2"/>
+          <a:blip r:embed="rId3"/>
           <a:stretch>
             <a:fillRect/>
           </a:stretch>
@@ -4542,7 +5959,7 @@
             </a:pPr>
             <a:r>
               <a:rPr/>
-              <a:t>Younger Black males</a:t>
+              <a:t>Demographics: Perpetrator, by Race</a:t>
             </a:r>
           </a:p>
         </p:txBody>
@@ -4567,32 +5984,14 @@
             </a:pPr>
             <a:r>
               <a:rPr/>
-              <a:t>We can narrow the data to consider only the combined fractions for victims and perpetrators coded as Black males in the 18-24 or 25-44 age groups.</a:t>
-            </a:r>
-          </a:p>
-          <a:p>
-            <a:pPr lvl="0" indent="0" marL="0">
-              <a:buNone/>
-            </a:pPr>
-            <a:r>
-              <a:rPr/>
-              <a:t>More than half of all shooting incidents involve someone in this demographic as victim, and roughly the same proportion as perpetrator (where known).</a:t>
-            </a:r>
-          </a:p>
-          <a:p>
-            <a:pPr lvl="0" indent="0" marL="0">
-              <a:buNone/>
-            </a:pPr>
-            <a:r>
-              <a:rPr/>
-              <a:t>The entire Black population of NYC is just under a quarter of the city; males in this age group would be a still smaller fraction.</a:t>
+              <a:t>The same holds true, in almost the same proportions, for the perpetrator’s race (where known), again disproportionately so.</a:t>
             </a:r>
           </a:p>
         </p:txBody>
       </p:sp>
       <p:pic>
         <p:nvPicPr>
-          <p:cNvPr descr="NYPDShootingDataSlides_files/figure-pptx/aggregate_demo-1.png" id="0" name="Picture 1"/>
+          <p:cNvPr descr="NYPDShootingDataSlides_files/figure-pptx/perp_race-1.png" id="0" name="Picture 1"/>
           <p:cNvPicPr>
             <a:picLocks noGrp="1" noChangeAspect="1"/>
           </p:cNvPicPr>
@@ -4644,7 +6043,7 @@
       </p:grpSpPr>
       <p:sp>
         <p:nvSpPr>
-          <p:cNvPr id="2" name="Title 1"/>
+          <p:cNvPr id="8" name="Title 7"/>
           <p:cNvSpPr>
             <a:spLocks noGrp="1"/>
           </p:cNvSpPr>
@@ -4652,17 +6051,22 @@
             <p:ph type="title"/>
           </p:nvPr>
         </p:nvSpPr>
-        <p:spPr/>
-        <p:txBody>
-          <a:bodyPr/>
-          <a:lstStyle/>
-          <a:p>
-            <a:pPr lvl="0" indent="0" marL="0">
-              <a:buNone/>
-            </a:pPr>
-            <a:r>
-              <a:rPr/>
-              <a:t>Conclusions - Temporal Conclusions</a:t>
+        <p:spPr>
+          <a:xfrm>
+            <a:off x="822960" y="286604"/>
+            <a:ext cx="7543800" cy="1450757"/>
+          </a:xfrm>
+        </p:spPr>
+        <p:txBody>
+          <a:bodyPr/>
+          <a:lstStyle/>
+          <a:p>
+            <a:pPr lvl="0" indent="0" marL="0">
+              <a:buNone/>
+            </a:pPr>
+            <a:r>
+              <a:rPr/>
+              <a:t>Younger Black males</a:t>
             </a:r>
           </a:p>
         </p:txBody>
@@ -4674,24 +6078,80 @@
             <a:spLocks noGrp="1"/>
           </p:cNvSpPr>
           <p:nvPr>
-            <p:ph idx="1"/>
-          </p:nvPr>
-        </p:nvSpPr>
-        <p:spPr/>
-        <p:txBody>
-          <a:bodyPr/>
-          <a:lstStyle/>
-          <a:p>
-            <a:pPr lvl="0" indent="0" marL="0">
-              <a:buNone/>
-            </a:pPr>
-            <a:r>
-              <a:rPr/>
-              <a:t>Despite sharp changes in overall incident counts, there are strong seasonal patterns at multiple scales: over the course of a day, a week, and a year</a:t>
-            </a:r>
-          </a:p>
-        </p:txBody>
-      </p:sp>
+            <p:ph idx="1" sz="half"/>
+          </p:nvPr>
+        </p:nvSpPr>
+        <p:spPr/>
+        <p:txBody>
+          <a:bodyPr/>
+          <a:lstStyle/>
+          <a:p>
+            <a:pPr lvl="0" indent="0" marL="0">
+              <a:buNone/>
+            </a:pPr>
+            <a:r>
+              <a:rPr/>
+              <a:t>We can narrow the data to consider only the combined fractions for victims and perpetrators coded as Black males in the 18-24 or 25-44 age groups.</a:t>
+            </a:r>
+          </a:p>
+          <a:p>
+            <a:pPr lvl="0" indent="0" marL="0">
+              <a:buNone/>
+            </a:pPr>
+            <a:r>
+              <a:rPr/>
+              <a:t>More than half of all shooting incidents involve someone in this demographic as victim, and roughly the same proportion as perpetrator (where known).</a:t>
+            </a:r>
+          </a:p>
+          <a:p>
+            <a:pPr lvl="0" indent="0" marL="0">
+              <a:buNone/>
+            </a:pPr>
+            <a:r>
+              <a:rPr/>
+              <a:t>The </a:t>
+            </a:r>
+            <a:r>
+              <a:rPr i="1"/>
+              <a:t>entire</a:t>
+            </a:r>
+            <a:r>
+              <a:rPr/>
+              <a:t> Black population of NYC is just under a quarter of the city, so the corresponding line is an overestimate of the fraction of Black males in this age group.</a:t>
+            </a:r>
+          </a:p>
+        </p:txBody>
+      </p:sp>
+      <p:pic>
+        <p:nvPicPr>
+          <p:cNvPr descr="NYPDShootingDataSlides_files/figure-pptx/aggregate_demo-1.png" id="0" name="Picture 1"/>
+          <p:cNvPicPr>
+            <a:picLocks noGrp="1" noChangeAspect="1"/>
+          </p:cNvPicPr>
+          <p:nvPr/>
+        </p:nvPicPr>
+        <p:blipFill>
+          <a:blip r:embed="rId2"/>
+          <a:stretch>
+            <a:fillRect/>
+          </a:stretch>
+        </p:blipFill>
+        <p:spPr bwMode="auto">
+          <a:xfrm>
+            <a:off x="4660900" y="2374900"/>
+            <a:ext cx="3695700" cy="2959100"/>
+          </a:xfrm>
+          <a:prstGeom prst="rect">
+            <a:avLst/>
+          </a:prstGeom>
+          <a:noFill/>
+          <a:ln w="9525">
+            <a:noFill/>
+            <a:headEnd/>
+            <a:tailEnd/>
+          </a:ln>
+        </p:spPr>
+      </p:pic>
     </p:spTree>
   </p:cSld>
 </p:sld>
@@ -5345,7 +6805,7 @@
             </a:r>
             <a:r>
               <a:rPr>
-                <a:hlinkClick r:id="rId2"/>
+                <a:hlinkClick r:id="rId3"/>
               </a:rPr>
               <a:t>https://catalog.data.gov/dataset/nypd-shooting-incident-data-historic</a:t>
             </a:r>
@@ -5355,7 +6815,7 @@
             </a:r>
             <a:r>
               <a:rPr>
-                <a:hlinkClick r:id="rId3"/>
+                <a:hlinkClick r:id="rId4"/>
               </a:rPr>
               <a:t>https://bit.ly/3KSLRjA</a:t>
             </a:r>
@@ -5458,7 +6918,7 @@
             </a:r>
             <a:r>
               <a:rPr>
-                <a:hlinkClick r:id="rId2"/>
+                <a:hlinkClick r:id="rId3"/>
               </a:rPr>
               <a:t>https://www.weather.gov/media/okx/Climate/CentralPark/DailyAvgTNormals.pdf</a:t>
             </a:r>
@@ -5471,7 +6931,7 @@
             </a:r>
             <a:r>
               <a:rPr>
-                <a:hlinkClick r:id="rId3"/>
+                <a:hlinkClick r:id="rId4"/>
               </a:rPr>
               <a:t>https://www.census.gov/quickfacts/newyorkcitynewyork</a:t>
             </a:r>
@@ -5545,7 +7005,7 @@
             </a:pPr>
             <a:r>
               <a:rPr/>
-              <a:t>Be cautious; this data is from a law enforcement agency reporting on its own jurisdiction, and may have obvious as well as unexpected biases or gaps in the collection and reporting process.</a:t>
+              <a:t>Be cautious; this data is from a agency reporting on its own jurisdiction, and may have resulting biases or gaps in the collection, characterization, and reporting process.</a:t>
             </a:r>
           </a:p>
         </p:txBody>
@@ -5621,7 +7081,7 @@
             </a:r>
             <a:r>
               <a:rPr>
-                <a:hlinkClick r:id="rId2"/>
+                <a:hlinkClick r:id="rId3"/>
               </a:rPr>
               <a:t>https://github.com/symmatree/data-science/tree/main/r</a:t>
             </a:r>
@@ -5631,53 +7091,53 @@
             <a:r>
               <a:rPr/>
               <a:t>These slides: Source (</a:t>
-            </a:r>
-            <a:r>
-              <a:rPr>
-                <a:hlinkClick r:id="rId3"/>
-              </a:rPr>
-              <a:t>https://github.com/symmatree/data-science/raw/main/r/NYPDShootingDataSlides.Rmd</a:t>
-            </a:r>
-            <a:r>
-              <a:rPr/>
-              <a:t>) / </a:t>
             </a:r>
             <a:r>
               <a:rPr>
                 <a:hlinkClick r:id="rId4"/>
               </a:rPr>
-              <a:t>pdf</a:t>
-            </a:r>
-            <a:r>
-              <a:rPr/>
-              <a:t> / </a:t>
+              <a:t>https://github.com/symmatree/data-science/raw/main/r/NYPDShootingDataSlides.Rmd</a:t>
+            </a:r>
+            <a:r>
+              <a:rPr/>
+              <a:t>) / </a:t>
             </a:r>
             <a:r>
               <a:rPr>
                 <a:hlinkClick r:id="rId5"/>
               </a:rPr>
-              <a:t>pptx</a:t>
-            </a:r>
-          </a:p>
-          <a:p>
-            <a:pPr lvl="0"/>
-            <a:r>
-              <a:rPr/>
-              <a:t>The full analysis document has more discussion of data tidying and methods: </a:t>
+              <a:t>pdf</a:t>
+            </a:r>
+            <a:r>
+              <a:rPr/>
+              <a:t> / </a:t>
             </a:r>
             <a:r>
               <a:rPr>
                 <a:hlinkClick r:id="rId6"/>
               </a:rPr>
-              <a:t>https://github.com/symmatree/data-science/raw/main/r/NYPDShootingData.Rmd</a:t>
-            </a:r>
-            <a:r>
-              <a:rPr/>
-              <a:t> (source) / </a:t>
+              <a:t>pptx</a:t>
+            </a:r>
+          </a:p>
+          <a:p>
+            <a:pPr lvl="0"/>
+            <a:r>
+              <a:rPr/>
+              <a:t>The full analysis document has more discussion of data tidying and methods: </a:t>
             </a:r>
             <a:r>
               <a:rPr>
                 <a:hlinkClick r:id="rId7"/>
+              </a:rPr>
+              <a:t>https://github.com/symmatree/data-science/raw/main/r/NYPDShootingData.Rmd</a:t>
+            </a:r>
+            <a:r>
+              <a:rPr/>
+              <a:t> (source) / </a:t>
+            </a:r>
+            <a:r>
+              <a:rPr>
+                <a:hlinkClick r:id="rId8"/>
               </a:rPr>
               <a:t>pdf</a:t>
             </a:r>
@@ -5963,7 +7423,7 @@
           <p:nvPr/>
         </p:nvPicPr>
         <p:blipFill>
-          <a:blip r:embed="rId2"/>
+          <a:blip r:embed="rId3"/>
           <a:stretch>
             <a:fillRect/>
           </a:stretch>

</xml_diff>